<commit_message>
url update in presentation
</commit_message>
<xml_diff>
--- a/slaidid.pptx
+++ b/slaidid.pptx
@@ -11520,7 +11520,7 @@
         </p:spPr>
         <p:txBody>
           <a:bodyPr>
-            <a:normAutofit fontScale="92500" lnSpcReduction="10000"/>
+            <a:normAutofit fontScale="85000" lnSpcReduction="20000"/>
           </a:bodyPr>
           <a:lstStyle/>
           <a:p>
@@ -11541,17 +11541,19 @@
             </a:r>
           </a:p>
           <a:p>
+            <a:pPr marL="0" indent="0">
+              <a:buNone/>
+            </a:pPr>
+            <a:r>
+              <a:rPr lang="et-EE" dirty="0">
+                <a:hlinkClick r:id="rId3"/>
+              </a:rPr>
+              <a:t>https://github.com/malrock/tyloeng051118</a:t>
+            </a:r>
+            <a:endParaRPr lang="et-EE" dirty="0"/>
+          </a:p>
+          <a:p>
             <a:pPr lvl="1"/>
-            <a:r>
-              <a:rPr lang="et-EE" dirty="0"/>
-              <a:t>https://github.com/.....</a:t>
-            </a:r>
-            <a:endParaRPr lang="en-GB" dirty="0"/>
-          </a:p>
-          <a:p>
-            <a:pPr marL="0" indent="0">
-              <a:buNone/>
-            </a:pPr>
             <a:endParaRPr lang="et-EE" dirty="0">
               <a:latin typeface="Proxima Nova Lt" pitchFamily="50" charset="-70"/>
             </a:endParaRPr>

</xml_diff>